<commit_message>
Add git team usage end to end flow example
</commit_message>
<xml_diff>
--- a/05. Branch concept/Presentation/Branch concept.pptx
+++ b/05. Branch concept/Presentation/Branch concept.pptx
@@ -205,7 +205,7 @@
           <a:p>
             <a:fld id="{7387BF4C-1AC5-8047-9CB7-F6FE835C9ED7}" type="datetimeFigureOut">
               <a:rPr lang="en-US" smtClean="0"/>
-              <a:t>9/4/23</a:t>
+              <a:t>11/13/23</a:t>
             </a:fld>
             <a:endParaRPr lang="en-US"/>
           </a:p>
@@ -707,7 +707,7 @@
           <a:p>
             <a:fld id="{490E0566-2D9A-8349-94CE-22DF369B8F30}" type="datetime1">
               <a:rPr lang="en-US" smtClean="0"/>
-              <a:t>9/4/23</a:t>
+              <a:t>11/13/23</a:t>
             </a:fld>
             <a:endParaRPr lang="en-US"/>
           </a:p>
@@ -908,7 +908,7 @@
           <a:p>
             <a:fld id="{77D82A1C-DCCB-F942-B4C8-2616E50FC610}" type="datetime1">
               <a:rPr lang="en-US" smtClean="0"/>
-              <a:t>9/4/23</a:t>
+              <a:t>11/13/23</a:t>
             </a:fld>
             <a:endParaRPr lang="en-US"/>
           </a:p>
@@ -1119,7 +1119,7 @@
           <a:p>
             <a:fld id="{047ECBFF-73A1-A944-AFD4-F359C9557B10}" type="datetime1">
               <a:rPr lang="en-US" smtClean="0"/>
-              <a:t>9/4/23</a:t>
+              <a:t>11/13/23</a:t>
             </a:fld>
             <a:endParaRPr lang="en-US"/>
           </a:p>
@@ -1342,7 +1342,7 @@
           <a:p>
             <a:fld id="{490E0566-2D9A-8349-94CE-22DF369B8F30}" type="datetime1">
               <a:rPr lang="en-US" smtClean="0"/>
-              <a:t>9/4/23</a:t>
+              <a:t>11/13/23</a:t>
             </a:fld>
             <a:endParaRPr lang="en-US"/>
           </a:p>
@@ -1543,7 +1543,7 @@
           <a:p>
             <a:fld id="{F4C6DED6-70D8-F640-A3FF-0DAAD5020B2E}" type="datetime1">
               <a:rPr lang="en-US" smtClean="0"/>
-              <a:t>9/4/23</a:t>
+              <a:t>11/13/23</a:t>
             </a:fld>
             <a:endParaRPr lang="en-US"/>
           </a:p>
@@ -1821,7 +1821,7 @@
           <a:p>
             <a:fld id="{315BBD7F-BEBD-8A4D-8771-D6866751C9CB}" type="datetime1">
               <a:rPr lang="en-US" smtClean="0"/>
-              <a:t>9/4/23</a:t>
+              <a:t>11/13/23</a:t>
             </a:fld>
             <a:endParaRPr lang="en-US"/>
           </a:p>
@@ -2089,7 +2089,7 @@
           <a:p>
             <a:fld id="{732B2173-0BAA-D644-B2E1-15CD564136DA}" type="datetime1">
               <a:rPr lang="en-US" smtClean="0"/>
-              <a:t>9/4/23</a:t>
+              <a:t>11/13/23</a:t>
             </a:fld>
             <a:endParaRPr lang="en-US"/>
           </a:p>
@@ -2504,7 +2504,7 @@
           <a:p>
             <a:fld id="{460457B8-75DE-F14E-B35F-7D7AA7D67DC5}" type="datetime1">
               <a:rPr lang="en-US" smtClean="0"/>
-              <a:t>9/4/23</a:t>
+              <a:t>11/13/23</a:t>
             </a:fld>
             <a:endParaRPr lang="en-US"/>
           </a:p>
@@ -2648,7 +2648,7 @@
           <a:p>
             <a:fld id="{99E91BB6-5CF1-E946-8756-B969CA4EAC90}" type="datetime1">
               <a:rPr lang="en-US" smtClean="0"/>
-              <a:t>9/4/23</a:t>
+              <a:t>11/13/23</a:t>
             </a:fld>
             <a:endParaRPr lang="en-US"/>
           </a:p>
@@ -2764,7 +2764,7 @@
           <a:p>
             <a:fld id="{D3592C8E-4E5B-8D4D-9A2C-ED2D4214E42D}" type="datetime1">
               <a:rPr lang="en-US" smtClean="0"/>
-              <a:t>9/4/23</a:t>
+              <a:t>11/13/23</a:t>
             </a:fld>
             <a:endParaRPr lang="en-US"/>
           </a:p>
@@ -3078,7 +3078,7 @@
           <a:p>
             <a:fld id="{A185CA14-CC43-E04C-A1B9-DA538B78C78B}" type="datetime1">
               <a:rPr lang="en-US" smtClean="0"/>
-              <a:t>9/4/23</a:t>
+              <a:t>11/13/23</a:t>
             </a:fld>
             <a:endParaRPr lang="en-US"/>
           </a:p>
@@ -3279,7 +3279,7 @@
           <a:p>
             <a:fld id="{F4C6DED6-70D8-F640-A3FF-0DAAD5020B2E}" type="datetime1">
               <a:rPr lang="en-US" smtClean="0"/>
-              <a:t>9/4/23</a:t>
+              <a:t>11/13/23</a:t>
             </a:fld>
             <a:endParaRPr lang="en-US"/>
           </a:p>
@@ -3570,7 +3570,7 @@
           <a:p>
             <a:fld id="{7BFD17D5-B327-1746-9545-80B79DBEEDDD}" type="datetime1">
               <a:rPr lang="en-US" smtClean="0"/>
-              <a:t>9/4/23</a:t>
+              <a:t>11/13/23</a:t>
             </a:fld>
             <a:endParaRPr lang="en-US"/>
           </a:p>
@@ -3771,7 +3771,7 @@
           <a:p>
             <a:fld id="{77D82A1C-DCCB-F942-B4C8-2616E50FC610}" type="datetime1">
               <a:rPr lang="en-US" smtClean="0"/>
-              <a:t>9/4/23</a:t>
+              <a:t>11/13/23</a:t>
             </a:fld>
             <a:endParaRPr lang="en-US"/>
           </a:p>
@@ -3982,7 +3982,7 @@
           <a:p>
             <a:fld id="{047ECBFF-73A1-A944-AFD4-F359C9557B10}" type="datetime1">
               <a:rPr lang="en-US" smtClean="0"/>
-              <a:t>9/4/23</a:t>
+              <a:t>11/13/23</a:t>
             </a:fld>
             <a:endParaRPr lang="en-US"/>
           </a:p>
@@ -4205,7 +4205,7 @@
           <a:p>
             <a:fld id="{490E0566-2D9A-8349-94CE-22DF369B8F30}" type="datetime1">
               <a:rPr lang="en-US" smtClean="0"/>
-              <a:t>9/4/23</a:t>
+              <a:t>11/13/23</a:t>
             </a:fld>
             <a:endParaRPr lang="en-US"/>
           </a:p>
@@ -4406,7 +4406,7 @@
           <a:p>
             <a:fld id="{F4C6DED6-70D8-F640-A3FF-0DAAD5020B2E}" type="datetime1">
               <a:rPr lang="en-US" smtClean="0"/>
-              <a:t>9/4/23</a:t>
+              <a:t>11/13/23</a:t>
             </a:fld>
             <a:endParaRPr lang="en-US"/>
           </a:p>
@@ -4684,7 +4684,7 @@
           <a:p>
             <a:fld id="{315BBD7F-BEBD-8A4D-8771-D6866751C9CB}" type="datetime1">
               <a:rPr lang="en-US" smtClean="0"/>
-              <a:t>9/4/23</a:t>
+              <a:t>11/13/23</a:t>
             </a:fld>
             <a:endParaRPr lang="en-US"/>
           </a:p>
@@ -4952,7 +4952,7 @@
           <a:p>
             <a:fld id="{732B2173-0BAA-D644-B2E1-15CD564136DA}" type="datetime1">
               <a:rPr lang="en-US" smtClean="0"/>
-              <a:t>9/4/23</a:t>
+              <a:t>11/13/23</a:t>
             </a:fld>
             <a:endParaRPr lang="en-US"/>
           </a:p>
@@ -5367,7 +5367,7 @@
           <a:p>
             <a:fld id="{460457B8-75DE-F14E-B35F-7D7AA7D67DC5}" type="datetime1">
               <a:rPr lang="en-US" smtClean="0"/>
-              <a:t>9/4/23</a:t>
+              <a:t>11/13/23</a:t>
             </a:fld>
             <a:endParaRPr lang="en-US"/>
           </a:p>
@@ -5511,7 +5511,7 @@
           <a:p>
             <a:fld id="{99E91BB6-5CF1-E946-8756-B969CA4EAC90}" type="datetime1">
               <a:rPr lang="en-US" smtClean="0"/>
-              <a:t>9/4/23</a:t>
+              <a:t>11/13/23</a:t>
             </a:fld>
             <a:endParaRPr lang="en-US"/>
           </a:p>
@@ -5627,7 +5627,7 @@
           <a:p>
             <a:fld id="{D3592C8E-4E5B-8D4D-9A2C-ED2D4214E42D}" type="datetime1">
               <a:rPr lang="en-US" smtClean="0"/>
-              <a:t>9/4/23</a:t>
+              <a:t>11/13/23</a:t>
             </a:fld>
             <a:endParaRPr lang="en-US"/>
           </a:p>
@@ -5905,7 +5905,7 @@
           <a:p>
             <a:fld id="{315BBD7F-BEBD-8A4D-8771-D6866751C9CB}" type="datetime1">
               <a:rPr lang="en-US" smtClean="0"/>
-              <a:t>9/4/23</a:t>
+              <a:t>11/13/23</a:t>
             </a:fld>
             <a:endParaRPr lang="en-US"/>
           </a:p>
@@ -6219,7 +6219,7 @@
           <a:p>
             <a:fld id="{A185CA14-CC43-E04C-A1B9-DA538B78C78B}" type="datetime1">
               <a:rPr lang="en-US" smtClean="0"/>
-              <a:t>9/4/23</a:t>
+              <a:t>11/13/23</a:t>
             </a:fld>
             <a:endParaRPr lang="en-US"/>
           </a:p>
@@ -6510,7 +6510,7 @@
           <a:p>
             <a:fld id="{7BFD17D5-B327-1746-9545-80B79DBEEDDD}" type="datetime1">
               <a:rPr lang="en-US" smtClean="0"/>
-              <a:t>9/4/23</a:t>
+              <a:t>11/13/23</a:t>
             </a:fld>
             <a:endParaRPr lang="en-US"/>
           </a:p>
@@ -6711,7 +6711,7 @@
           <a:p>
             <a:fld id="{77D82A1C-DCCB-F942-B4C8-2616E50FC610}" type="datetime1">
               <a:rPr lang="en-US" smtClean="0"/>
-              <a:t>9/4/23</a:t>
+              <a:t>11/13/23</a:t>
             </a:fld>
             <a:endParaRPr lang="en-US"/>
           </a:p>
@@ -6922,7 +6922,7 @@
           <a:p>
             <a:fld id="{047ECBFF-73A1-A944-AFD4-F359C9557B10}" type="datetime1">
               <a:rPr lang="en-US" smtClean="0"/>
-              <a:t>9/4/23</a:t>
+              <a:t>11/13/23</a:t>
             </a:fld>
             <a:endParaRPr lang="en-US"/>
           </a:p>
@@ -7190,7 +7190,7 @@
           <a:p>
             <a:fld id="{732B2173-0BAA-D644-B2E1-15CD564136DA}" type="datetime1">
               <a:rPr lang="en-US" smtClean="0"/>
-              <a:t>9/4/23</a:t>
+              <a:t>11/13/23</a:t>
             </a:fld>
             <a:endParaRPr lang="en-US"/>
           </a:p>
@@ -7605,7 +7605,7 @@
           <a:p>
             <a:fld id="{460457B8-75DE-F14E-B35F-7D7AA7D67DC5}" type="datetime1">
               <a:rPr lang="en-US" smtClean="0"/>
-              <a:t>9/4/23</a:t>
+              <a:t>11/13/23</a:t>
             </a:fld>
             <a:endParaRPr lang="en-US"/>
           </a:p>
@@ -7749,7 +7749,7 @@
           <a:p>
             <a:fld id="{99E91BB6-5CF1-E946-8756-B969CA4EAC90}" type="datetime1">
               <a:rPr lang="en-US" smtClean="0"/>
-              <a:t>9/4/23</a:t>
+              <a:t>11/13/23</a:t>
             </a:fld>
             <a:endParaRPr lang="en-US"/>
           </a:p>
@@ -7865,7 +7865,7 @@
           <a:p>
             <a:fld id="{D3592C8E-4E5B-8D4D-9A2C-ED2D4214E42D}" type="datetime1">
               <a:rPr lang="en-US" smtClean="0"/>
-              <a:t>9/4/23</a:t>
+              <a:t>11/13/23</a:t>
             </a:fld>
             <a:endParaRPr lang="en-US"/>
           </a:p>
@@ -8179,7 +8179,7 @@
           <a:p>
             <a:fld id="{A185CA14-CC43-E04C-A1B9-DA538B78C78B}" type="datetime1">
               <a:rPr lang="en-US" smtClean="0"/>
-              <a:t>9/4/23</a:t>
+              <a:t>11/13/23</a:t>
             </a:fld>
             <a:endParaRPr lang="en-US"/>
           </a:p>
@@ -8470,7 +8470,7 @@
           <a:p>
             <a:fld id="{7BFD17D5-B327-1746-9545-80B79DBEEDDD}" type="datetime1">
               <a:rPr lang="en-US" smtClean="0"/>
-              <a:t>9/4/23</a:t>
+              <a:t>11/13/23</a:t>
             </a:fld>
             <a:endParaRPr lang="en-US"/>
           </a:p>
@@ -8717,7 +8717,7 @@
           <a:p>
             <a:fld id="{0362EEAF-02AB-9644-9FA5-CC38EBED914C}" type="datetime1">
               <a:rPr lang="en-US" smtClean="0"/>
-              <a:t>9/4/23</a:t>
+              <a:t>11/13/23</a:t>
             </a:fld>
             <a:endParaRPr lang="en-US"/>
           </a:p>
@@ -9292,7 +9292,7 @@
           <a:p>
             <a:fld id="{0362EEAF-02AB-9644-9FA5-CC38EBED914C}" type="datetime1">
               <a:rPr lang="en-US" smtClean="0"/>
-              <a:t>9/4/23</a:t>
+              <a:t>11/13/23</a:t>
             </a:fld>
             <a:endParaRPr lang="en-US"/>
           </a:p>
@@ -9867,7 +9867,7 @@
           <a:p>
             <a:fld id="{0362EEAF-02AB-9644-9FA5-CC38EBED914C}" type="datetime1">
               <a:rPr lang="en-US" smtClean="0"/>
-              <a:t>9/4/23</a:t>
+              <a:t>11/13/23</a:t>
             </a:fld>
             <a:endParaRPr lang="en-US"/>
           </a:p>

</xml_diff>